<commit_message>
Updated site for leo version 2016.05.2
</commit_message>
<xml_diff>
--- a/presentations/Framework_for_Rapid_Development.pptx
+++ b/presentations/Framework_for_Rapid_Development.pptx
@@ -215,7 +215,7 @@
           <a:p>
             <a:fld id="{8F306F4F-2C56-854D-9151-D5568BECB391}" type="datetimeFigureOut">
               <a:rPr lang="en-US" smtClean="0"/>
-              <a:t>12/3/14</a:t>
+              <a:t>3/19/15</a:t>
             </a:fld>
             <a:endParaRPr lang="en-US"/>
           </a:p>
@@ -947,7 +947,7 @@
             <a:fld id="{C271E495-FD0A-4E65-AE46-D35AC9636DCF}" type="datetime1">
               <a:rPr lang="en-US"/>
               <a:pPr/>
-              <a:t>12/3/14</a:t>
+              <a:t>3/19/15</a:t>
             </a:fld>
             <a:endParaRPr lang="en-US"/>
           </a:p>
@@ -1129,7 +1129,7 @@
             <a:fld id="{A76F1133-00A1-4C69-950F-D1E8F0511CDD}" type="datetime1">
               <a:rPr lang="en-US"/>
               <a:pPr/>
-              <a:t>12/3/14</a:t>
+              <a:t>3/19/15</a:t>
             </a:fld>
             <a:endParaRPr lang="en-US"/>
           </a:p>
@@ -1321,7 +1321,7 @@
             <a:fld id="{FC1E2A9B-A576-46ED-A409-75DB7C861D0B}" type="datetime1">
               <a:rPr lang="en-US"/>
               <a:pPr/>
-              <a:t>12/3/14</a:t>
+              <a:t>3/19/15</a:t>
             </a:fld>
             <a:endParaRPr lang="en-US"/>
           </a:p>
@@ -1528,7 +1528,7 @@
             <a:fld id="{96DE1AE7-EF95-406E-80EF-0091139C2847}" type="datetime1">
               <a:rPr lang="en-US"/>
               <a:pPr/>
-              <a:t>12/3/14</a:t>
+              <a:t>3/19/15</a:t>
             </a:fld>
             <a:endParaRPr lang="en-US"/>
           </a:p>
@@ -1810,7 +1810,7 @@
             <a:fld id="{1AB5803D-E300-40F1-A06A-0ADAB3A87FD8}" type="datetime1">
               <a:rPr lang="en-US"/>
               <a:pPr/>
-              <a:t>12/3/14</a:t>
+              <a:t>3/19/15</a:t>
             </a:fld>
             <a:endParaRPr lang="en-US"/>
           </a:p>
@@ -2110,7 +2110,7 @@
             <a:fld id="{09652C68-FECA-40FE-B8BC-CC4A006AFC3D}" type="datetime1">
               <a:rPr lang="en-US"/>
               <a:pPr/>
-              <a:t>12/3/14</a:t>
+              <a:t>3/19/15</a:t>
             </a:fld>
             <a:endParaRPr lang="en-US"/>
           </a:p>
@@ -2544,7 +2544,7 @@
             <a:fld id="{F5063447-8492-44EC-B64F-DAB8BF106FFD}" type="datetime1">
               <a:rPr lang="en-US"/>
               <a:pPr/>
-              <a:t>12/3/14</a:t>
+              <a:t>3/19/15</a:t>
             </a:fld>
             <a:endParaRPr lang="en-US"/>
           </a:p>
@@ -2674,7 +2674,7 @@
             <a:fld id="{22AA1E23-7AC8-4759-8BF3-7B1E0192BACF}" type="datetime1">
               <a:rPr lang="en-US"/>
               <a:pPr/>
-              <a:t>12/3/14</a:t>
+              <a:t>3/19/15</a:t>
             </a:fld>
             <a:endParaRPr lang="en-US"/>
           </a:p>
@@ -2781,7 +2781,7 @@
             <a:fld id="{D9FCC948-6689-4C48-BBAA-2772D02AC501}" type="datetime1">
               <a:rPr lang="en-US"/>
               <a:pPr/>
-              <a:t>12/3/14</a:t>
+              <a:t>3/19/15</a:t>
             </a:fld>
             <a:endParaRPr lang="en-US"/>
           </a:p>
@@ -3070,7 +3070,7 @@
             <a:fld id="{B619E64F-CF78-487F-9255-CA1615AE934A}" type="datetime1">
               <a:rPr lang="en-US"/>
               <a:pPr/>
-              <a:t>12/3/14</a:t>
+              <a:t>3/19/15</a:t>
             </a:fld>
             <a:endParaRPr lang="en-US"/>
           </a:p>
@@ -3342,7 +3342,7 @@
             <a:fld id="{1CF8F4E4-BA13-4EAB-A411-EB932F01F199}" type="datetime1">
               <a:rPr lang="en-US"/>
               <a:pPr/>
-              <a:t>12/3/14</a:t>
+              <a:t>3/19/15</a:t>
             </a:fld>
             <a:endParaRPr lang="en-US"/>
           </a:p>
@@ -3590,7 +3590,7 @@
             <a:fld id="{E083146E-487B-426A-B8AF-88A9B28F3C16}" type="datetime1">
               <a:rPr lang="en-US"/>
               <a:pPr/>
-              <a:t>12/3/14</a:t>
+              <a:t>3/19/15</a:t>
             </a:fld>
             <a:endParaRPr lang="en-US"/>
           </a:p>
@@ -16546,43 +16546,102 @@
             <p:ph type="title"/>
           </p:nvPr>
         </p:nvSpPr>
-        <p:spPr/>
+        <p:spPr>
+          <a:xfrm>
+            <a:off x="880496" y="149259"/>
+            <a:ext cx="8229600" cy="639762"/>
+          </a:xfrm>
+        </p:spPr>
         <p:txBody>
           <a:bodyPr/>
           <a:lstStyle/>
           <a:p>
             <a:r>
               <a:rPr lang="en-US" dirty="0" smtClean="0"/>
-              <a:t>Current Release 2013.11.1</a:t>
+              <a:t>Release and Documentation</a:t>
             </a:r>
             <a:endParaRPr lang="en-US" dirty="0"/>
           </a:p>
         </p:txBody>
       </p:sp>
-      <p:pic>
-        <p:nvPicPr>
-          <p:cNvPr id="4" name="Picture 3"/>
-          <p:cNvPicPr>
-            <a:picLocks noChangeAspect="1"/>
-          </p:cNvPicPr>
+      <p:sp>
+        <p:nvSpPr>
+          <p:cNvPr id="3" name="Rectangle 2"/>
+          <p:cNvSpPr/>
           <p:nvPr/>
-        </p:nvPicPr>
-        <p:blipFill>
-          <a:blip r:embed="rId2"/>
-          <a:stretch>
-            <a:fillRect/>
-          </a:stretch>
-        </p:blipFill>
+        </p:nvSpPr>
         <p:spPr>
           <a:xfrm>
-            <a:off x="2743200" y="1625600"/>
-            <a:ext cx="3657600" cy="3594100"/>
+            <a:off x="989634" y="1729935"/>
+            <a:ext cx="7317681" cy="369332"/>
           </a:xfrm>
           <a:prstGeom prst="rect">
             <a:avLst/>
           </a:prstGeom>
         </p:spPr>
-      </p:pic>
+        <p:txBody>
+          <a:bodyPr wrap="square">
+            <a:spAutoFit/>
+          </a:bodyPr>
+          <a:lstStyle/>
+          <a:p>
+            <a:r>
+              <a:rPr lang="en-US" u="sng" dirty="0"/>
+              <a:t>http://department-of-veterans-</a:t>
+            </a:r>
+            <a:r>
+              <a:rPr lang="en-US" u="sng" dirty="0" err="1"/>
+              <a:t>affairs.github.io</a:t>
+            </a:r>
+            <a:r>
+              <a:rPr lang="en-US" u="sng" dirty="0"/>
+              <a:t>/Leo/</a:t>
+            </a:r>
+            <a:r>
+              <a:rPr lang="en-US" u="sng" dirty="0" err="1"/>
+              <a:t>index.html</a:t>
+            </a:r>
+            <a:endParaRPr lang="en-US" dirty="0"/>
+          </a:p>
+        </p:txBody>
+      </p:sp>
+      <p:sp>
+        <p:nvSpPr>
+          <p:cNvPr id="5" name="Rectangle 4"/>
+          <p:cNvSpPr/>
+          <p:nvPr/>
+        </p:nvSpPr>
+        <p:spPr>
+          <a:xfrm>
+            <a:off x="989634" y="2603102"/>
+            <a:ext cx="6021315" cy="369332"/>
+          </a:xfrm>
+          <a:prstGeom prst="rect">
+            <a:avLst/>
+          </a:prstGeom>
+        </p:spPr>
+        <p:txBody>
+          <a:bodyPr wrap="square">
+            <a:spAutoFit/>
+          </a:bodyPr>
+          <a:lstStyle/>
+          <a:p>
+            <a:r>
+              <a:rPr lang="en-US" u="sng" dirty="0"/>
+              <a:t>https://</a:t>
+            </a:r>
+            <a:r>
+              <a:rPr lang="en-US" u="sng" dirty="0" err="1"/>
+              <a:t>github.com</a:t>
+            </a:r>
+            <a:r>
+              <a:rPr lang="en-US" u="sng" dirty="0"/>
+              <a:t>/department-of-veterans-affairs/Leo</a:t>
+            </a:r>
+            <a:endParaRPr lang="en-US" dirty="0"/>
+          </a:p>
+        </p:txBody>
+      </p:sp>
     </p:spTree>
     <p:extLst>
       <p:ext uri="{BB962C8B-B14F-4D97-AF65-F5344CB8AC3E}">

</xml_diff>